<commit_message>
Powerpoints and Error Handling demo project
</commit_message>
<xml_diff>
--- a/Documents/Powerpoints/2.0 Object Oriented Programming.pptx
+++ b/Documents/Powerpoints/2.0 Object Oriented Programming.pptx
@@ -209,7 +209,7 @@
           <a:p>
             <a:fld id="{605057AE-2ACF-4699-AAF5-2F1028A51323}" type="datetimeFigureOut">
               <a:rPr lang="en-US" smtClean="0"/>
-              <a:t>1/25/2019</a:t>
+              <a:t>1/27/2019</a:t>
             </a:fld>
             <a:endParaRPr lang="en-US"/>
           </a:p>
@@ -770,7 +770,7 @@
           <a:p>
             <a:fld id="{517570FD-78B0-488A-8CDF-FCC61FEA96CB}" type="datetimeFigureOut">
               <a:rPr lang="en-US" smtClean="0"/>
-              <a:t>1/25/2019</a:t>
+              <a:t>1/27/2019</a:t>
             </a:fld>
             <a:endParaRPr lang="en-US"/>
           </a:p>
@@ -1073,7 +1073,7 @@
           <a:p>
             <a:fld id="{517570FD-78B0-488A-8CDF-FCC61FEA96CB}" type="datetimeFigureOut">
               <a:rPr lang="en-US" smtClean="0"/>
-              <a:t>1/25/2019</a:t>
+              <a:t>1/27/2019</a:t>
             </a:fld>
             <a:endParaRPr lang="en-US"/>
           </a:p>
@@ -1265,7 +1265,7 @@
           <a:p>
             <a:fld id="{517570FD-78B0-488A-8CDF-FCC61FEA96CB}" type="datetimeFigureOut">
               <a:rPr lang="en-US" smtClean="0"/>
-              <a:t>1/25/2019</a:t>
+              <a:t>1/27/2019</a:t>
             </a:fld>
             <a:endParaRPr lang="en-US"/>
           </a:p>
@@ -1526,7 +1526,7 @@
           <a:p>
             <a:fld id="{517570FD-78B0-488A-8CDF-FCC61FEA96CB}" type="datetimeFigureOut">
               <a:rPr lang="en-US" smtClean="0"/>
-              <a:t>1/25/2019</a:t>
+              <a:t>1/27/2019</a:t>
             </a:fld>
             <a:endParaRPr lang="en-US"/>
           </a:p>
@@ -1950,7 +1950,7 @@
           <a:p>
             <a:fld id="{517570FD-78B0-488A-8CDF-FCC61FEA96CB}" type="datetimeFigureOut">
               <a:rPr lang="en-US" smtClean="0"/>
-              <a:t>1/25/2019</a:t>
+              <a:t>1/27/2019</a:t>
             </a:fld>
             <a:endParaRPr lang="en-US"/>
           </a:p>
@@ -2487,7 +2487,7 @@
           <a:p>
             <a:fld id="{517570FD-78B0-488A-8CDF-FCC61FEA96CB}" type="datetimeFigureOut">
               <a:rPr lang="en-US" smtClean="0"/>
-              <a:t>1/25/2019</a:t>
+              <a:t>1/27/2019</a:t>
             </a:fld>
             <a:endParaRPr lang="en-US"/>
           </a:p>
@@ -3351,7 +3351,7 @@
           <a:p>
             <a:fld id="{517570FD-78B0-488A-8CDF-FCC61FEA96CB}" type="datetimeFigureOut">
               <a:rPr lang="en-US" smtClean="0"/>
-              <a:t>1/25/2019</a:t>
+              <a:t>1/27/2019</a:t>
             </a:fld>
             <a:endParaRPr lang="en-US"/>
           </a:p>
@@ -3521,7 +3521,7 @@
           <a:p>
             <a:fld id="{517570FD-78B0-488A-8CDF-FCC61FEA96CB}" type="datetimeFigureOut">
               <a:rPr lang="en-US" smtClean="0"/>
-              <a:t>1/25/2019</a:t>
+              <a:t>1/27/2019</a:t>
             </a:fld>
             <a:endParaRPr lang="en-US"/>
           </a:p>
@@ -3705,7 +3705,7 @@
           <a:p>
             <a:fld id="{517570FD-78B0-488A-8CDF-FCC61FEA96CB}" type="datetimeFigureOut">
               <a:rPr lang="en-US" smtClean="0"/>
-              <a:t>1/25/2019</a:t>
+              <a:t>1/27/2019</a:t>
             </a:fld>
             <a:endParaRPr lang="en-US"/>
           </a:p>
@@ -3880,7 +3880,7 @@
           <a:p>
             <a:fld id="{517570FD-78B0-488A-8CDF-FCC61FEA96CB}" type="datetimeFigureOut">
               <a:rPr lang="en-US" smtClean="0"/>
-              <a:t>1/25/2019</a:t>
+              <a:t>1/27/2019</a:t>
             </a:fld>
             <a:endParaRPr lang="en-US"/>
           </a:p>
@@ -4124,7 +4124,7 @@
           <a:p>
             <a:fld id="{517570FD-78B0-488A-8CDF-FCC61FEA96CB}" type="datetimeFigureOut">
               <a:rPr lang="en-US" smtClean="0"/>
-              <a:t>1/25/2019</a:t>
+              <a:t>1/27/2019</a:t>
             </a:fld>
             <a:endParaRPr lang="en-US"/>
           </a:p>
@@ -4365,7 +4365,7 @@
           <a:p>
             <a:fld id="{517570FD-78B0-488A-8CDF-FCC61FEA96CB}" type="datetimeFigureOut">
               <a:rPr lang="en-US" smtClean="0"/>
-              <a:t>1/25/2019</a:t>
+              <a:t>1/27/2019</a:t>
             </a:fld>
             <a:endParaRPr lang="en-US"/>
           </a:p>
@@ -4831,7 +4831,7 @@
           <a:p>
             <a:fld id="{517570FD-78B0-488A-8CDF-FCC61FEA96CB}" type="datetimeFigureOut">
               <a:rPr lang="en-US" smtClean="0"/>
-              <a:t>1/25/2019</a:t>
+              <a:t>1/27/2019</a:t>
             </a:fld>
             <a:endParaRPr lang="en-US"/>
           </a:p>
@@ -4949,7 +4949,7 @@
           <a:p>
             <a:fld id="{517570FD-78B0-488A-8CDF-FCC61FEA96CB}" type="datetimeFigureOut">
               <a:rPr lang="en-US" smtClean="0"/>
-              <a:t>1/25/2019</a:t>
+              <a:t>1/27/2019</a:t>
             </a:fld>
             <a:endParaRPr lang="en-US"/>
           </a:p>
@@ -5044,7 +5044,7 @@
           <a:p>
             <a:fld id="{517570FD-78B0-488A-8CDF-FCC61FEA96CB}" type="datetimeFigureOut">
               <a:rPr lang="en-US" smtClean="0"/>
-              <a:t>1/25/2019</a:t>
+              <a:t>1/27/2019</a:t>
             </a:fld>
             <a:endParaRPr lang="en-US"/>
           </a:p>
@@ -5299,7 +5299,7 @@
           <a:p>
             <a:fld id="{517570FD-78B0-488A-8CDF-FCC61FEA96CB}" type="datetimeFigureOut">
               <a:rPr lang="en-US" smtClean="0"/>
-              <a:t>1/25/2019</a:t>
+              <a:t>1/27/2019</a:t>
             </a:fld>
             <a:endParaRPr lang="en-US"/>
           </a:p>
@@ -5599,7 +5599,7 @@
           <a:p>
             <a:fld id="{517570FD-78B0-488A-8CDF-FCC61FEA96CB}" type="datetimeFigureOut">
               <a:rPr lang="en-US" smtClean="0"/>
-              <a:t>1/25/2019</a:t>
+              <a:t>1/27/2019</a:t>
             </a:fld>
             <a:endParaRPr lang="en-US"/>
           </a:p>
@@ -5833,7 +5833,7 @@
           <a:p>
             <a:fld id="{517570FD-78B0-488A-8CDF-FCC61FEA96CB}" type="datetimeFigureOut">
               <a:rPr lang="en-US" smtClean="0"/>
-              <a:t>1/25/2019</a:t>
+              <a:t>1/27/2019</a:t>
             </a:fld>
             <a:endParaRPr lang="en-US"/>
           </a:p>
@@ -6752,7 +6752,7 @@
         <p:spPr>
           <a:xfrm>
             <a:off x="0" y="1732451"/>
-            <a:ext cx="6894787" cy="5125549"/>
+            <a:ext cx="6161103" cy="5125549"/>
           </a:xfrm>
         </p:spPr>
         <p:txBody>

</xml_diff>